<commit_message>
Revert "update the images"
This reverts commit 017c47fb3d744c6143a2f7e179d40eacb0244f13.
</commit_message>
<xml_diff>
--- a/Presentation/frozen_orbit1.pptx
+++ b/Presentation/frozen_orbit1.pptx
@@ -182,7 +182,6 @@
 <p1510:revInfo xmlns:a="http://schemas.openxmlformats.org/drawingml/2006/main" xmlns:r="http://schemas.openxmlformats.org/officeDocument/2006/relationships" xmlns:p1510="http://schemas.microsoft.com/office/powerpoint/2015/10/main">
   <p1510:revLst>
     <p1510:client id="{31473BE9-0D82-4ABB-A311-CB31F9F364DA}" v="83" dt="2022-11-28T12:17:32.979"/>
-    <p1510:client id="{D35B35E3-E0DF-441C-8EAA-AE91011677CB}" v="29" dt="2022-11-28T17:04:45.591"/>
   </p1510:revLst>
 </p1510:revInfo>
 </file>
@@ -1166,294 +1165,6 @@
             <ac:spMk id="3" creationId="{52300C93-EBAB-2E27-9035-E8F3E5857265}"/>
           </ac:spMkLst>
         </pc:spChg>
-      </pc:sldChg>
-    </pc:docChg>
-  </pc:docChgLst>
-  <pc:docChgLst>
-    <pc:chgData name="Ziqing Yu" userId="76dbd0bb75f3aa62" providerId="LiveId" clId="{D35B35E3-E0DF-441C-8EAA-AE91011677CB}"/>
-    <pc:docChg chg="modSld">
-      <pc:chgData name="Ziqing Yu" userId="76dbd0bb75f3aa62" providerId="LiveId" clId="{D35B35E3-E0DF-441C-8EAA-AE91011677CB}" dt="2022-11-28T17:04:45.591" v="32" actId="962"/>
-      <pc:docMkLst>
-        <pc:docMk/>
-      </pc:docMkLst>
-      <pc:sldChg chg="addSp delSp modSp mod">
-        <pc:chgData name="Ziqing Yu" userId="76dbd0bb75f3aa62" providerId="LiveId" clId="{D35B35E3-E0DF-441C-8EAA-AE91011677CB}" dt="2022-11-28T17:03:25.311" v="2" actId="27614"/>
-        <pc:sldMkLst>
-          <pc:docMk/>
-          <pc:sldMk cId="1143448818" sldId="331"/>
-        </pc:sldMkLst>
-        <pc:spChg chg="add del mod">
-          <ac:chgData name="Ziqing Yu" userId="76dbd0bb75f3aa62" providerId="LiveId" clId="{D35B35E3-E0DF-441C-8EAA-AE91011677CB}" dt="2022-11-28T17:03:23.323" v="1"/>
-          <ac:spMkLst>
-            <pc:docMk/>
-            <pc:sldMk cId="1143448818" sldId="331"/>
-            <ac:spMk id="3" creationId="{3D317416-33F9-BD9B-C754-B71E66A3C707}"/>
-          </ac:spMkLst>
-        </pc:spChg>
-        <pc:picChg chg="add mod">
-          <ac:chgData name="Ziqing Yu" userId="76dbd0bb75f3aa62" providerId="LiveId" clId="{D35B35E3-E0DF-441C-8EAA-AE91011677CB}" dt="2022-11-28T17:03:25.311" v="2" actId="27614"/>
-          <ac:picMkLst>
-            <pc:docMk/>
-            <pc:sldMk cId="1143448818" sldId="331"/>
-            <ac:picMk id="6" creationId="{8452E53C-1F88-64CE-3D2B-F70BADC429B0}"/>
-          </ac:picMkLst>
-        </pc:picChg>
-        <pc:picChg chg="del">
-          <ac:chgData name="Ziqing Yu" userId="76dbd0bb75f3aa62" providerId="LiveId" clId="{D35B35E3-E0DF-441C-8EAA-AE91011677CB}" dt="2022-11-28T17:03:22.286" v="0" actId="478"/>
-          <ac:picMkLst>
-            <pc:docMk/>
-            <pc:sldMk cId="1143448818" sldId="331"/>
-            <ac:picMk id="10" creationId="{895C56A5-4D66-140E-04CC-200CEC6B33BD}"/>
-          </ac:picMkLst>
-        </pc:picChg>
-      </pc:sldChg>
-      <pc:sldChg chg="addSp delSp modSp">
-        <pc:chgData name="Ziqing Yu" userId="76dbd0bb75f3aa62" providerId="LiveId" clId="{D35B35E3-E0DF-441C-8EAA-AE91011677CB}" dt="2022-11-28T17:03:33.389" v="6" actId="962"/>
-        <pc:sldMkLst>
-          <pc:docMk/>
-          <pc:sldMk cId="3235998305" sldId="333"/>
-        </pc:sldMkLst>
-        <pc:spChg chg="add del mod">
-          <ac:chgData name="Ziqing Yu" userId="76dbd0bb75f3aa62" providerId="LiveId" clId="{D35B35E3-E0DF-441C-8EAA-AE91011677CB}" dt="2022-11-28T17:03:31.835" v="4"/>
-          <ac:spMkLst>
-            <pc:docMk/>
-            <pc:sldMk cId="3235998305" sldId="333"/>
-            <ac:spMk id="3" creationId="{ECECDAB3-4ACE-B19B-222C-40B6E0ADE24A}"/>
-          </ac:spMkLst>
-        </pc:spChg>
-        <pc:picChg chg="add mod">
-          <ac:chgData name="Ziqing Yu" userId="76dbd0bb75f3aa62" providerId="LiveId" clId="{D35B35E3-E0DF-441C-8EAA-AE91011677CB}" dt="2022-11-28T17:03:33.389" v="6" actId="962"/>
-          <ac:picMkLst>
-            <pc:docMk/>
-            <pc:sldMk cId="3235998305" sldId="333"/>
-            <ac:picMk id="6" creationId="{5DD3F7FA-AFBF-44FB-E8E1-019705E524A9}"/>
-          </ac:picMkLst>
-        </pc:picChg>
-        <pc:picChg chg="del">
-          <ac:chgData name="Ziqing Yu" userId="76dbd0bb75f3aa62" providerId="LiveId" clId="{D35B35E3-E0DF-441C-8EAA-AE91011677CB}" dt="2022-11-28T17:03:29.090" v="3" actId="478"/>
-          <ac:picMkLst>
-            <pc:docMk/>
-            <pc:sldMk cId="3235998305" sldId="333"/>
-            <ac:picMk id="10" creationId="{589D8906-6CC5-AE18-D501-1F906DBA2E59}"/>
-          </ac:picMkLst>
-        </pc:picChg>
-      </pc:sldChg>
-      <pc:sldChg chg="addSp delSp modSp">
-        <pc:chgData name="Ziqing Yu" userId="76dbd0bb75f3aa62" providerId="LiveId" clId="{D35B35E3-E0DF-441C-8EAA-AE91011677CB}" dt="2022-11-28T17:03:46.560" v="13" actId="962"/>
-        <pc:sldMkLst>
-          <pc:docMk/>
-          <pc:sldMk cId="1093912996" sldId="335"/>
-        </pc:sldMkLst>
-        <pc:spChg chg="add del mod">
-          <ac:chgData name="Ziqing Yu" userId="76dbd0bb75f3aa62" providerId="LiveId" clId="{D35B35E3-E0DF-441C-8EAA-AE91011677CB}" dt="2022-11-28T17:03:45.066" v="11"/>
-          <ac:spMkLst>
-            <pc:docMk/>
-            <pc:sldMk cId="1093912996" sldId="335"/>
-            <ac:spMk id="3" creationId="{04FF75D2-841A-4C89-AED9-56DF99523815}"/>
-          </ac:spMkLst>
-        </pc:spChg>
-        <pc:picChg chg="add mod">
-          <ac:chgData name="Ziqing Yu" userId="76dbd0bb75f3aa62" providerId="LiveId" clId="{D35B35E3-E0DF-441C-8EAA-AE91011677CB}" dt="2022-11-28T17:03:46.560" v="13" actId="962"/>
-          <ac:picMkLst>
-            <pc:docMk/>
-            <pc:sldMk cId="1093912996" sldId="335"/>
-            <ac:picMk id="6" creationId="{22C2381F-BFB0-D691-1BB4-68494BC9E378}"/>
-          </ac:picMkLst>
-        </pc:picChg>
-        <pc:picChg chg="del">
-          <ac:chgData name="Ziqing Yu" userId="76dbd0bb75f3aa62" providerId="LiveId" clId="{D35B35E3-E0DF-441C-8EAA-AE91011677CB}" dt="2022-11-28T17:03:42.876" v="10" actId="478"/>
-          <ac:picMkLst>
-            <pc:docMk/>
-            <pc:sldMk cId="1093912996" sldId="335"/>
-            <ac:picMk id="10" creationId="{5448A35C-BA44-B9B2-6467-EE82AF3578F6}"/>
-          </ac:picMkLst>
-        </pc:picChg>
-      </pc:sldChg>
-      <pc:sldChg chg="addSp delSp modSp mod">
-        <pc:chgData name="Ziqing Yu" userId="76dbd0bb75f3aa62" providerId="LiveId" clId="{D35B35E3-E0DF-441C-8EAA-AE91011677CB}" dt="2022-11-28T17:03:54.149" v="16" actId="27614"/>
-        <pc:sldMkLst>
-          <pc:docMk/>
-          <pc:sldMk cId="771101650" sldId="337"/>
-        </pc:sldMkLst>
-        <pc:spChg chg="add del mod">
-          <ac:chgData name="Ziqing Yu" userId="76dbd0bb75f3aa62" providerId="LiveId" clId="{D35B35E3-E0DF-441C-8EAA-AE91011677CB}" dt="2022-11-28T17:03:52.394" v="15"/>
-          <ac:spMkLst>
-            <pc:docMk/>
-            <pc:sldMk cId="771101650" sldId="337"/>
-            <ac:spMk id="3" creationId="{5228196E-A89E-32F2-2982-B0E9B7148E77}"/>
-          </ac:spMkLst>
-        </pc:spChg>
-        <pc:picChg chg="add mod">
-          <ac:chgData name="Ziqing Yu" userId="76dbd0bb75f3aa62" providerId="LiveId" clId="{D35B35E3-E0DF-441C-8EAA-AE91011677CB}" dt="2022-11-28T17:03:54.149" v="16" actId="27614"/>
-          <ac:picMkLst>
-            <pc:docMk/>
-            <pc:sldMk cId="771101650" sldId="337"/>
-            <ac:picMk id="6" creationId="{0FD6B1D9-3272-B013-CA06-19ACAA70ACD6}"/>
-          </ac:picMkLst>
-        </pc:picChg>
-        <pc:picChg chg="del">
-          <ac:chgData name="Ziqing Yu" userId="76dbd0bb75f3aa62" providerId="LiveId" clId="{D35B35E3-E0DF-441C-8EAA-AE91011677CB}" dt="2022-11-28T17:03:50.101" v="14" actId="478"/>
-          <ac:picMkLst>
-            <pc:docMk/>
-            <pc:sldMk cId="771101650" sldId="337"/>
-            <ac:picMk id="10" creationId="{8E2ED661-6EA3-5136-BC6D-DA55864EF0BB}"/>
-          </ac:picMkLst>
-        </pc:picChg>
-      </pc:sldChg>
-      <pc:sldChg chg="addSp delSp modSp mod">
-        <pc:chgData name="Ziqing Yu" userId="76dbd0bb75f3aa62" providerId="LiveId" clId="{D35B35E3-E0DF-441C-8EAA-AE91011677CB}" dt="2022-11-28T17:04:18.613" v="19" actId="27614"/>
-        <pc:sldMkLst>
-          <pc:docMk/>
-          <pc:sldMk cId="3074370798" sldId="339"/>
-        </pc:sldMkLst>
-        <pc:spChg chg="add del mod">
-          <ac:chgData name="Ziqing Yu" userId="76dbd0bb75f3aa62" providerId="LiveId" clId="{D35B35E3-E0DF-441C-8EAA-AE91011677CB}" dt="2022-11-28T17:04:17.107" v="18"/>
-          <ac:spMkLst>
-            <pc:docMk/>
-            <pc:sldMk cId="3074370798" sldId="339"/>
-            <ac:spMk id="3" creationId="{7D40FE72-139E-13F3-89D1-B80EE9BA582C}"/>
-          </ac:spMkLst>
-        </pc:spChg>
-        <pc:picChg chg="add mod">
-          <ac:chgData name="Ziqing Yu" userId="76dbd0bb75f3aa62" providerId="LiveId" clId="{D35B35E3-E0DF-441C-8EAA-AE91011677CB}" dt="2022-11-28T17:04:18.613" v="19" actId="27614"/>
-          <ac:picMkLst>
-            <pc:docMk/>
-            <pc:sldMk cId="3074370798" sldId="339"/>
-            <ac:picMk id="6" creationId="{13470257-0DC5-2C57-219A-1BA54EBD05B2}"/>
-          </ac:picMkLst>
-        </pc:picChg>
-        <pc:picChg chg="del">
-          <ac:chgData name="Ziqing Yu" userId="76dbd0bb75f3aa62" providerId="LiveId" clId="{D35B35E3-E0DF-441C-8EAA-AE91011677CB}" dt="2022-11-28T17:04:11.824" v="17" actId="478"/>
-          <ac:picMkLst>
-            <pc:docMk/>
-            <pc:sldMk cId="3074370798" sldId="339"/>
-            <ac:picMk id="10" creationId="{BFC187BE-1477-7C92-6FDF-928BB5648590}"/>
-          </ac:picMkLst>
-        </pc:picChg>
-      </pc:sldChg>
-      <pc:sldChg chg="addSp delSp modSp">
-        <pc:chgData name="Ziqing Yu" userId="76dbd0bb75f3aa62" providerId="LiveId" clId="{D35B35E3-E0DF-441C-8EAA-AE91011677CB}" dt="2022-11-28T17:04:33.278" v="23" actId="962"/>
-        <pc:sldMkLst>
-          <pc:docMk/>
-          <pc:sldMk cId="2180464758" sldId="341"/>
-        </pc:sldMkLst>
-        <pc:spChg chg="add del mod">
-          <ac:chgData name="Ziqing Yu" userId="76dbd0bb75f3aa62" providerId="LiveId" clId="{D35B35E3-E0DF-441C-8EAA-AE91011677CB}" dt="2022-11-28T17:04:32.487" v="21"/>
-          <ac:spMkLst>
-            <pc:docMk/>
-            <pc:sldMk cId="2180464758" sldId="341"/>
-            <ac:spMk id="3" creationId="{ABC48B8E-8331-AA15-8135-E6FC1D9F23CB}"/>
-          </ac:spMkLst>
-        </pc:spChg>
-        <pc:picChg chg="add mod">
-          <ac:chgData name="Ziqing Yu" userId="76dbd0bb75f3aa62" providerId="LiveId" clId="{D35B35E3-E0DF-441C-8EAA-AE91011677CB}" dt="2022-11-28T17:04:33.278" v="23" actId="962"/>
-          <ac:picMkLst>
-            <pc:docMk/>
-            <pc:sldMk cId="2180464758" sldId="341"/>
-            <ac:picMk id="6" creationId="{BE111668-DCAE-2BA3-4544-E6385E0CA831}"/>
-          </ac:picMkLst>
-        </pc:picChg>
-        <pc:picChg chg="del">
-          <ac:chgData name="Ziqing Yu" userId="76dbd0bb75f3aa62" providerId="LiveId" clId="{D35B35E3-E0DF-441C-8EAA-AE91011677CB}" dt="2022-11-28T17:04:28.242" v="20" actId="478"/>
-          <ac:picMkLst>
-            <pc:docMk/>
-            <pc:sldMk cId="2180464758" sldId="341"/>
-            <ac:picMk id="10" creationId="{0E7D6C4D-BD41-2457-B378-6CE5307EDEDF}"/>
-          </ac:picMkLst>
-        </pc:picChg>
-      </pc:sldChg>
-      <pc:sldChg chg="addSp delSp modSp">
-        <pc:chgData name="Ziqing Yu" userId="76dbd0bb75f3aa62" providerId="LiveId" clId="{D35B35E3-E0DF-441C-8EAA-AE91011677CB}" dt="2022-11-28T17:04:38.090" v="27" actId="962"/>
-        <pc:sldMkLst>
-          <pc:docMk/>
-          <pc:sldMk cId="2997382355" sldId="343"/>
-        </pc:sldMkLst>
-        <pc:spChg chg="add del mod">
-          <ac:chgData name="Ziqing Yu" userId="76dbd0bb75f3aa62" providerId="LiveId" clId="{D35B35E3-E0DF-441C-8EAA-AE91011677CB}" dt="2022-11-28T17:04:37.553" v="25"/>
-          <ac:spMkLst>
-            <pc:docMk/>
-            <pc:sldMk cId="2997382355" sldId="343"/>
-            <ac:spMk id="3" creationId="{3ABC756D-7A6B-C765-968C-95F66A81F13D}"/>
-          </ac:spMkLst>
-        </pc:spChg>
-        <pc:picChg chg="add mod">
-          <ac:chgData name="Ziqing Yu" userId="76dbd0bb75f3aa62" providerId="LiveId" clId="{D35B35E3-E0DF-441C-8EAA-AE91011677CB}" dt="2022-11-28T17:04:38.090" v="27" actId="962"/>
-          <ac:picMkLst>
-            <pc:docMk/>
-            <pc:sldMk cId="2997382355" sldId="343"/>
-            <ac:picMk id="6" creationId="{DA1F8619-084B-2E29-2B4A-7556B352C6D4}"/>
-          </ac:picMkLst>
-        </pc:picChg>
-        <pc:picChg chg="del">
-          <ac:chgData name="Ziqing Yu" userId="76dbd0bb75f3aa62" providerId="LiveId" clId="{D35B35E3-E0DF-441C-8EAA-AE91011677CB}" dt="2022-11-28T17:04:34.705" v="24" actId="478"/>
-          <ac:picMkLst>
-            <pc:docMk/>
-            <pc:sldMk cId="2997382355" sldId="343"/>
-            <ac:picMk id="10" creationId="{7FDC660C-A276-E360-8DD3-33A3606A0374}"/>
-          </ac:picMkLst>
-        </pc:picChg>
-      </pc:sldChg>
-      <pc:sldChg chg="addSp delSp modSp mod">
-        <pc:chgData name="Ziqing Yu" userId="76dbd0bb75f3aa62" providerId="LiveId" clId="{D35B35E3-E0DF-441C-8EAA-AE91011677CB}" dt="2022-11-28T17:03:42.461" v="9" actId="27614"/>
-        <pc:sldMkLst>
-          <pc:docMk/>
-          <pc:sldMk cId="2225581001" sldId="345"/>
-        </pc:sldMkLst>
-        <pc:spChg chg="add del mod">
-          <ac:chgData name="Ziqing Yu" userId="76dbd0bb75f3aa62" providerId="LiveId" clId="{D35B35E3-E0DF-441C-8EAA-AE91011677CB}" dt="2022-11-28T17:03:40.207" v="8"/>
-          <ac:spMkLst>
-            <pc:docMk/>
-            <pc:sldMk cId="2225581001" sldId="345"/>
-            <ac:spMk id="3" creationId="{122E6B56-64A8-A966-5AD0-79F782C57F46}"/>
-          </ac:spMkLst>
-        </pc:spChg>
-        <pc:picChg chg="add mod">
-          <ac:chgData name="Ziqing Yu" userId="76dbd0bb75f3aa62" providerId="LiveId" clId="{D35B35E3-E0DF-441C-8EAA-AE91011677CB}" dt="2022-11-28T17:03:42.461" v="9" actId="27614"/>
-          <ac:picMkLst>
-            <pc:docMk/>
-            <pc:sldMk cId="2225581001" sldId="345"/>
-            <ac:picMk id="6" creationId="{C2C7980D-70E3-4D8F-194B-56BD569F5ADC}"/>
-          </ac:picMkLst>
-        </pc:picChg>
-        <pc:picChg chg="del">
-          <ac:chgData name="Ziqing Yu" userId="76dbd0bb75f3aa62" providerId="LiveId" clId="{D35B35E3-E0DF-441C-8EAA-AE91011677CB}" dt="2022-11-28T17:03:37.756" v="7" actId="478"/>
-          <ac:picMkLst>
-            <pc:docMk/>
-            <pc:sldMk cId="2225581001" sldId="345"/>
-            <ac:picMk id="10" creationId="{678F0BEA-01FB-6474-2DE7-2B582F0D008F}"/>
-          </ac:picMkLst>
-        </pc:picChg>
-      </pc:sldChg>
-      <pc:sldChg chg="addSp delSp modSp">
-        <pc:chgData name="Ziqing Yu" userId="76dbd0bb75f3aa62" providerId="LiveId" clId="{D35B35E3-E0DF-441C-8EAA-AE91011677CB}" dt="2022-11-28T17:04:45.591" v="32" actId="962"/>
-        <pc:sldMkLst>
-          <pc:docMk/>
-          <pc:sldMk cId="3534031894" sldId="348"/>
-        </pc:sldMkLst>
-        <pc:spChg chg="add del mod">
-          <ac:chgData name="Ziqing Yu" userId="76dbd0bb75f3aa62" providerId="LiveId" clId="{D35B35E3-E0DF-441C-8EAA-AE91011677CB}" dt="2022-11-28T17:04:44.858" v="30"/>
-          <ac:spMkLst>
-            <pc:docMk/>
-            <pc:sldMk cId="3534031894" sldId="348"/>
-            <ac:spMk id="3" creationId="{34927EA6-7A85-8D42-682E-E7F8F106198F}"/>
-          </ac:spMkLst>
-        </pc:spChg>
-        <pc:picChg chg="add mod">
-          <ac:chgData name="Ziqing Yu" userId="76dbd0bb75f3aa62" providerId="LiveId" clId="{D35B35E3-E0DF-441C-8EAA-AE91011677CB}" dt="2022-11-28T17:04:45.591" v="32" actId="962"/>
-          <ac:picMkLst>
-            <pc:docMk/>
-            <pc:sldMk cId="3534031894" sldId="348"/>
-            <ac:picMk id="6" creationId="{AA969BD6-C9B0-2647-BAB2-72E3B7158437}"/>
-          </ac:picMkLst>
-        </pc:picChg>
-        <pc:picChg chg="del mod">
-          <ac:chgData name="Ziqing Yu" userId="76dbd0bb75f3aa62" providerId="LiveId" clId="{D35B35E3-E0DF-441C-8EAA-AE91011677CB}" dt="2022-11-28T17:04:43.794" v="29" actId="478"/>
-          <ac:picMkLst>
-            <pc:docMk/>
-            <pc:sldMk cId="3534031894" sldId="348"/>
-            <ac:picMk id="9" creationId="{3047CD55-112C-107A-F2E2-FF10B5420B93}"/>
-          </ac:picMkLst>
-        </pc:picChg>
       </pc:sldChg>
     </pc:docChg>
   </pc:docChgLst>
@@ -6584,6 +6295,41 @@
           </a:p>
         </p:txBody>
       </p:sp>
+      <p:pic>
+        <p:nvPicPr>
+          <p:cNvPr id="10" name="内容占位符 9">
+            <a:extLst>
+              <a:ext uri="{FF2B5EF4-FFF2-40B4-BE49-F238E27FC236}">
+                <a16:creationId xmlns:a16="http://schemas.microsoft.com/office/drawing/2014/main" id="{8E2ED661-6EA3-5136-BC6D-DA55864EF0BB}"/>
+              </a:ext>
+            </a:extLst>
+          </p:cNvPr>
+          <p:cNvPicPr>
+            <a:picLocks noGrp="1" noChangeAspect="1"/>
+          </p:cNvPicPr>
+          <p:nvPr>
+            <p:ph idx="1"/>
+          </p:nvPr>
+        </p:nvPicPr>
+        <p:blipFill>
+          <a:blip r:embed="rId2">
+            <a:extLst>
+              <a:ext uri="{28A0092B-C50C-407E-A947-70E740481C1C}">
+                <a14:useLocalDpi xmlns:a14="http://schemas.microsoft.com/office/drawing/2010/main" val="0"/>
+              </a:ext>
+            </a:extLst>
+          </a:blip>
+          <a:stretch>
+            <a:fillRect/>
+          </a:stretch>
+        </p:blipFill>
+        <p:spPr>
+          <a:xfrm>
+            <a:off x="685800" y="1564247"/>
+            <a:ext cx="7772400" cy="3958106"/>
+          </a:xfrm>
+        </p:spPr>
+      </p:pic>
       <p:sp>
         <p:nvSpPr>
           <p:cNvPr id="11" name="文本框 10">
@@ -6642,7 +6388,7 @@
             </a:r>
             <a:r>
               <a:rPr lang="en-US" altLang="zh-CN" sz="1200" dirty="0">
-                <a:hlinkClick r:id="rId2"/>
+                <a:hlinkClick r:id="rId3"/>
               </a:rPr>
               <a:t>https://sentinel.esa.int/documents/247904/3358207/Sentinel-3-Mission-Status-Report-20-November-2018</a:t>
             </a:r>
@@ -6650,41 +6396,6 @@
           </a:p>
         </p:txBody>
       </p:sp>
-      <p:pic>
-        <p:nvPicPr>
-          <p:cNvPr id="6" name="Content Placeholder 5" descr="A picture containing diagram&#10;&#10;Description automatically generated">
-            <a:extLst>
-              <a:ext uri="{FF2B5EF4-FFF2-40B4-BE49-F238E27FC236}">
-                <a16:creationId xmlns:a16="http://schemas.microsoft.com/office/drawing/2014/main" id="{0FD6B1D9-3272-B013-CA06-19ACAA70ACD6}"/>
-              </a:ext>
-            </a:extLst>
-          </p:cNvPr>
-          <p:cNvPicPr>
-            <a:picLocks noGrp="1" noChangeAspect="1"/>
-          </p:cNvPicPr>
-          <p:nvPr>
-            <p:ph idx="1"/>
-          </p:nvPr>
-        </p:nvPicPr>
-        <p:blipFill>
-          <a:blip r:embed="rId3">
-            <a:extLst>
-              <a:ext uri="{28A0092B-C50C-407E-A947-70E740481C1C}">
-                <a14:useLocalDpi xmlns:a14="http://schemas.microsoft.com/office/drawing/2010/main" val="0"/>
-              </a:ext>
-            </a:extLst>
-          </a:blip>
-          <a:stretch>
-            <a:fillRect/>
-          </a:stretch>
-        </p:blipFill>
-        <p:spPr>
-          <a:xfrm>
-            <a:off x="685800" y="1530314"/>
-            <a:ext cx="7772400" cy="4025972"/>
-          </a:xfrm>
-        </p:spPr>
-      </p:pic>
     </p:spTree>
     <p:extLst>
       <p:ext uri="{BB962C8B-B14F-4D97-AF65-F5344CB8AC3E}">
@@ -7077,10 +6788,10 @@
       </p:sp>
       <p:pic>
         <p:nvPicPr>
-          <p:cNvPr id="6" name="Content Placeholder 5" descr="A picture containing application&#10;&#10;Description automatically generated">
-            <a:extLst>
-              <a:ext uri="{FF2B5EF4-FFF2-40B4-BE49-F238E27FC236}">
-                <a16:creationId xmlns:a16="http://schemas.microsoft.com/office/drawing/2014/main" id="{13470257-0DC5-2C57-219A-1BA54EBD05B2}"/>
+          <p:cNvPr id="10" name="内容占位符 9">
+            <a:extLst>
+              <a:ext uri="{FF2B5EF4-FFF2-40B4-BE49-F238E27FC236}">
+                <a16:creationId xmlns:a16="http://schemas.microsoft.com/office/drawing/2014/main" id="{BFC187BE-1477-7C92-6FDF-928BB5648590}"/>
               </a:ext>
             </a:extLst>
           </p:cNvPr>
@@ -7105,8 +6816,8 @@
         </p:blipFill>
         <p:spPr>
           <a:xfrm>
-            <a:off x="685800" y="1530314"/>
-            <a:ext cx="7772400" cy="4025972"/>
+            <a:off x="685800" y="1564247"/>
+            <a:ext cx="7772400" cy="3958106"/>
           </a:xfrm>
         </p:spPr>
       </p:pic>
@@ -7333,10 +7044,10 @@
       </p:sp>
       <p:pic>
         <p:nvPicPr>
-          <p:cNvPr id="6" name="Content Placeholder 5" descr="A picture containing calendar&#10;&#10;Description automatically generated">
-            <a:extLst>
-              <a:ext uri="{FF2B5EF4-FFF2-40B4-BE49-F238E27FC236}">
-                <a16:creationId xmlns:a16="http://schemas.microsoft.com/office/drawing/2014/main" id="{BE111668-DCAE-2BA3-4544-E6385E0CA831}"/>
+          <p:cNvPr id="10" name="内容占位符 9">
+            <a:extLst>
+              <a:ext uri="{FF2B5EF4-FFF2-40B4-BE49-F238E27FC236}">
+                <a16:creationId xmlns:a16="http://schemas.microsoft.com/office/drawing/2014/main" id="{0E7D6C4D-BD41-2457-B378-6CE5307EDEDF}"/>
               </a:ext>
             </a:extLst>
           </p:cNvPr>
@@ -7361,8 +7072,8 @@
         </p:blipFill>
         <p:spPr>
           <a:xfrm>
-            <a:off x="685800" y="1530314"/>
-            <a:ext cx="7772400" cy="4025972"/>
+            <a:off x="685800" y="1564247"/>
+            <a:ext cx="7772400" cy="3958106"/>
           </a:xfrm>
         </p:spPr>
       </p:pic>
@@ -7589,10 +7300,10 @@
       </p:sp>
       <p:pic>
         <p:nvPicPr>
-          <p:cNvPr id="6" name="Content Placeholder 5" descr="A picture containing calendar&#10;&#10;Description automatically generated">
-            <a:extLst>
-              <a:ext uri="{FF2B5EF4-FFF2-40B4-BE49-F238E27FC236}">
-                <a16:creationId xmlns:a16="http://schemas.microsoft.com/office/drawing/2014/main" id="{DA1F8619-084B-2E29-2B4A-7556B352C6D4}"/>
+          <p:cNvPr id="10" name="内容占位符 9">
+            <a:extLst>
+              <a:ext uri="{FF2B5EF4-FFF2-40B4-BE49-F238E27FC236}">
+                <a16:creationId xmlns:a16="http://schemas.microsoft.com/office/drawing/2014/main" id="{7FDC660C-A276-E360-8DD3-33A3606A0374}"/>
               </a:ext>
             </a:extLst>
           </p:cNvPr>
@@ -7617,8 +7328,8 @@
         </p:blipFill>
         <p:spPr>
           <a:xfrm>
-            <a:off x="685800" y="1530314"/>
-            <a:ext cx="7772400" cy="4025972"/>
+            <a:off x="685800" y="1564247"/>
+            <a:ext cx="7772400" cy="3958106"/>
           </a:xfrm>
         </p:spPr>
       </p:pic>
@@ -8396,10 +8107,10 @@
       </p:sp>
       <p:pic>
         <p:nvPicPr>
-          <p:cNvPr id="6" name="Content Placeholder 5" descr="Graphical user interface, text, application&#10;&#10;Description automatically generated">
-            <a:extLst>
-              <a:ext uri="{FF2B5EF4-FFF2-40B4-BE49-F238E27FC236}">
-                <a16:creationId xmlns:a16="http://schemas.microsoft.com/office/drawing/2014/main" id="{AA969BD6-C9B0-2647-BAB2-72E3B7158437}"/>
+          <p:cNvPr id="9" name="内容占位符 8">
+            <a:extLst>
+              <a:ext uri="{FF2B5EF4-FFF2-40B4-BE49-F238E27FC236}">
+                <a16:creationId xmlns:a16="http://schemas.microsoft.com/office/drawing/2014/main" id="{3047CD55-112C-107A-F2E2-FF10B5420B93}"/>
               </a:ext>
             </a:extLst>
           </p:cNvPr>
@@ -8424,8 +8135,8 @@
         </p:blipFill>
         <p:spPr>
           <a:xfrm>
-            <a:off x="685800" y="1530314"/>
-            <a:ext cx="7772400" cy="4025972"/>
+            <a:off x="755576" y="1449947"/>
+            <a:ext cx="7772400" cy="3958106"/>
           </a:xfrm>
         </p:spPr>
       </p:pic>
@@ -8750,10 +8461,10 @@
       </p:sp>
       <p:pic>
         <p:nvPicPr>
-          <p:cNvPr id="6" name="Content Placeholder 5" descr="Chart&#10;&#10;Description automatically generated">
-            <a:extLst>
-              <a:ext uri="{FF2B5EF4-FFF2-40B4-BE49-F238E27FC236}">
-                <a16:creationId xmlns:a16="http://schemas.microsoft.com/office/drawing/2014/main" id="{8452E53C-1F88-64CE-3D2B-F70BADC429B0}"/>
+          <p:cNvPr id="10" name="内容占位符 9">
+            <a:extLst>
+              <a:ext uri="{FF2B5EF4-FFF2-40B4-BE49-F238E27FC236}">
+                <a16:creationId xmlns:a16="http://schemas.microsoft.com/office/drawing/2014/main" id="{895C56A5-4D66-140E-04CC-200CEC6B33BD}"/>
               </a:ext>
             </a:extLst>
           </p:cNvPr>
@@ -8778,8 +8489,8 @@
         </p:blipFill>
         <p:spPr>
           <a:xfrm>
-            <a:off x="685800" y="1530314"/>
-            <a:ext cx="7772400" cy="4025972"/>
+            <a:off x="685800" y="1564247"/>
+            <a:ext cx="7772400" cy="3958106"/>
           </a:xfrm>
         </p:spPr>
       </p:pic>
@@ -9006,10 +8717,10 @@
       </p:sp>
       <p:pic>
         <p:nvPicPr>
-          <p:cNvPr id="6" name="Content Placeholder 5" descr="Chart&#10;&#10;Description automatically generated">
-            <a:extLst>
-              <a:ext uri="{FF2B5EF4-FFF2-40B4-BE49-F238E27FC236}">
-                <a16:creationId xmlns:a16="http://schemas.microsoft.com/office/drawing/2014/main" id="{5DD3F7FA-AFBF-44FB-E8E1-019705E524A9}"/>
+          <p:cNvPr id="10" name="内容占位符 9">
+            <a:extLst>
+              <a:ext uri="{FF2B5EF4-FFF2-40B4-BE49-F238E27FC236}">
+                <a16:creationId xmlns:a16="http://schemas.microsoft.com/office/drawing/2014/main" id="{589D8906-6CC5-AE18-D501-1F906DBA2E59}"/>
               </a:ext>
             </a:extLst>
           </p:cNvPr>
@@ -9034,8 +8745,8 @@
         </p:blipFill>
         <p:spPr>
           <a:xfrm>
-            <a:off x="685800" y="1530314"/>
-            <a:ext cx="7772400" cy="4025972"/>
+            <a:off x="685800" y="1564247"/>
+            <a:ext cx="7772400" cy="3958106"/>
           </a:xfrm>
         </p:spPr>
       </p:pic>
@@ -9262,10 +8973,10 @@
       </p:sp>
       <p:pic>
         <p:nvPicPr>
-          <p:cNvPr id="6" name="Content Placeholder 5" descr="Chart&#10;&#10;Description automatically generated">
-            <a:extLst>
-              <a:ext uri="{FF2B5EF4-FFF2-40B4-BE49-F238E27FC236}">
-                <a16:creationId xmlns:a16="http://schemas.microsoft.com/office/drawing/2014/main" id="{C2C7980D-70E3-4D8F-194B-56BD569F5ADC}"/>
+          <p:cNvPr id="10" name="内容占位符 9">
+            <a:extLst>
+              <a:ext uri="{FF2B5EF4-FFF2-40B4-BE49-F238E27FC236}">
+                <a16:creationId xmlns:a16="http://schemas.microsoft.com/office/drawing/2014/main" id="{678F0BEA-01FB-6474-2DE7-2B582F0D008F}"/>
               </a:ext>
             </a:extLst>
           </p:cNvPr>
@@ -9290,8 +9001,8 @@
         </p:blipFill>
         <p:spPr>
           <a:xfrm>
-            <a:off x="685800" y="1530314"/>
-            <a:ext cx="7772400" cy="4025972"/>
+            <a:off x="685800" y="1564247"/>
+            <a:ext cx="7772400" cy="3958106"/>
           </a:xfrm>
         </p:spPr>
       </p:pic>
@@ -9518,10 +9229,10 @@
       </p:sp>
       <p:pic>
         <p:nvPicPr>
-          <p:cNvPr id="6" name="Content Placeholder 5" descr="Graphical user interface, application&#10;&#10;Description automatically generated with medium confidence">
-            <a:extLst>
-              <a:ext uri="{FF2B5EF4-FFF2-40B4-BE49-F238E27FC236}">
-                <a16:creationId xmlns:a16="http://schemas.microsoft.com/office/drawing/2014/main" id="{22C2381F-BFB0-D691-1BB4-68494BC9E378}"/>
+          <p:cNvPr id="10" name="内容占位符 9">
+            <a:extLst>
+              <a:ext uri="{FF2B5EF4-FFF2-40B4-BE49-F238E27FC236}">
+                <a16:creationId xmlns:a16="http://schemas.microsoft.com/office/drawing/2014/main" id="{5448A35C-BA44-B9B2-6467-EE82AF3578F6}"/>
               </a:ext>
             </a:extLst>
           </p:cNvPr>
@@ -9546,8 +9257,8 @@
         </p:blipFill>
         <p:spPr>
           <a:xfrm>
-            <a:off x="685800" y="1530314"/>
-            <a:ext cx="7772400" cy="4025972"/>
+            <a:off x="685800" y="1564247"/>
+            <a:ext cx="7772400" cy="3958106"/>
           </a:xfrm>
         </p:spPr>
       </p:pic>

</xml_diff>